<commit_message>
make changes to presentation
</commit_message>
<xml_diff>
--- a/presentation/Introduction to Web Mapping.pptx
+++ b/presentation/Introduction to Web Mapping.pptx
@@ -21,13 +21,16 @@
     <p:sldId id="270" r:id="rId15"/>
     <p:sldId id="271" r:id="rId16"/>
     <p:sldId id="273" r:id="rId17"/>
-    <p:sldId id="272" r:id="rId18"/>
-    <p:sldId id="274" r:id="rId19"/>
-    <p:sldId id="275" r:id="rId20"/>
-    <p:sldId id="276" r:id="rId21"/>
-    <p:sldId id="277" r:id="rId22"/>
-    <p:sldId id="278" r:id="rId23"/>
-    <p:sldId id="279" r:id="rId24"/>
+    <p:sldId id="281" r:id="rId18"/>
+    <p:sldId id="282" r:id="rId19"/>
+    <p:sldId id="280" r:id="rId20"/>
+    <p:sldId id="272" r:id="rId21"/>
+    <p:sldId id="274" r:id="rId22"/>
+    <p:sldId id="275" r:id="rId23"/>
+    <p:sldId id="276" r:id="rId24"/>
+    <p:sldId id="277" r:id="rId25"/>
+    <p:sldId id="278" r:id="rId26"/>
+    <p:sldId id="279" r:id="rId27"/>
   </p:sldIdLst>
   <p:sldSz cx="9144000" cy="5143500" type="screen16x9"/>
   <p:notesSz cx="6858000" cy="9144000"/>
@@ -310,7 +313,8 @@
           <a:p>
             <a:fld id="{D192356E-1989-45DF-9A8F-140A23C2747A}" type="datetimeFigureOut">
               <a:rPr lang="en-US" smtClean="0"/>
-              <a:t>11/12/2014</a:t>
+              <a:pPr/>
+              <a:t>2/18/2015</a:t>
             </a:fld>
             <a:endParaRPr lang="en-US"/>
           </a:p>
@@ -352,6 +356,7 @@
           <a:p>
             <a:fld id="{FA2AA385-65D7-4078-9D43-7BADBAF381FB}" type="slidenum">
               <a:rPr lang="en-US" smtClean="0"/>
+              <a:pPr/>
               <a:t>‹#›</a:t>
             </a:fld>
             <a:endParaRPr lang="en-US"/>
@@ -475,7 +480,8 @@
           <a:p>
             <a:fld id="{D192356E-1989-45DF-9A8F-140A23C2747A}" type="datetimeFigureOut">
               <a:rPr lang="en-US" smtClean="0"/>
-              <a:t>11/12/2014</a:t>
+              <a:pPr/>
+              <a:t>2/18/2015</a:t>
             </a:fld>
             <a:endParaRPr lang="en-US"/>
           </a:p>
@@ -517,6 +523,7 @@
           <a:p>
             <a:fld id="{FA2AA385-65D7-4078-9D43-7BADBAF381FB}" type="slidenum">
               <a:rPr lang="en-US" smtClean="0"/>
+              <a:pPr/>
               <a:t>‹#›</a:t>
             </a:fld>
             <a:endParaRPr lang="en-US"/>
@@ -657,7 +664,8 @@
           <a:p>
             <a:fld id="{D192356E-1989-45DF-9A8F-140A23C2747A}" type="datetimeFigureOut">
               <a:rPr lang="en-US" smtClean="0"/>
-              <a:t>11/12/2014</a:t>
+              <a:pPr/>
+              <a:t>2/18/2015</a:t>
             </a:fld>
             <a:endParaRPr lang="en-US"/>
           </a:p>
@@ -699,6 +707,7 @@
           <a:p>
             <a:fld id="{FA2AA385-65D7-4078-9D43-7BADBAF381FB}" type="slidenum">
               <a:rPr lang="en-US" smtClean="0"/>
+              <a:pPr/>
               <a:t>‹#›</a:t>
             </a:fld>
             <a:endParaRPr lang="en-US"/>
@@ -782,7 +791,8 @@
           <a:p>
             <a:fld id="{D192356E-1989-45DF-9A8F-140A23C2747A}" type="datetimeFigureOut">
               <a:rPr lang="en-US" smtClean="0"/>
-              <a:t>11/12/2014</a:t>
+              <a:pPr/>
+              <a:t>2/18/2015</a:t>
             </a:fld>
             <a:endParaRPr lang="en-US"/>
           </a:p>
@@ -824,6 +834,7 @@
           <a:p>
             <a:fld id="{FA2AA385-65D7-4078-9D43-7BADBAF381FB}" type="slidenum">
               <a:rPr lang="en-US" smtClean="0"/>
+              <a:pPr/>
               <a:t>‹#›</a:t>
             </a:fld>
             <a:endParaRPr lang="en-US"/>
@@ -1023,7 +1034,8 @@
           <a:p>
             <a:fld id="{D192356E-1989-45DF-9A8F-140A23C2747A}" type="datetimeFigureOut">
               <a:rPr lang="en-US" smtClean="0"/>
-              <a:t>11/12/2014</a:t>
+              <a:pPr/>
+              <a:t>2/18/2015</a:t>
             </a:fld>
             <a:endParaRPr lang="en-US"/>
           </a:p>
@@ -1065,6 +1077,7 @@
           <a:p>
             <a:fld id="{FA2AA385-65D7-4078-9D43-7BADBAF381FB}" type="slidenum">
               <a:rPr lang="en-US" smtClean="0"/>
+              <a:pPr/>
               <a:t>‹#›</a:t>
             </a:fld>
             <a:endParaRPr lang="en-US"/>
@@ -1221,7 +1234,8 @@
           <a:p>
             <a:fld id="{D192356E-1989-45DF-9A8F-140A23C2747A}" type="datetimeFigureOut">
               <a:rPr lang="en-US" smtClean="0"/>
-              <a:t>11/12/2014</a:t>
+              <a:pPr/>
+              <a:t>2/18/2015</a:t>
             </a:fld>
             <a:endParaRPr lang="en-US"/>
           </a:p>
@@ -1263,6 +1277,7 @@
           <a:p>
             <a:fld id="{FA2AA385-65D7-4078-9D43-7BADBAF381FB}" type="slidenum">
               <a:rPr lang="en-US" smtClean="0"/>
+              <a:pPr/>
               <a:t>‹#›</a:t>
             </a:fld>
             <a:endParaRPr lang="en-US"/>
@@ -1650,7 +1665,8 @@
           <a:p>
             <a:fld id="{D192356E-1989-45DF-9A8F-140A23C2747A}" type="datetimeFigureOut">
               <a:rPr lang="en-US" smtClean="0"/>
-              <a:t>11/12/2014</a:t>
+              <a:pPr/>
+              <a:t>2/18/2015</a:t>
             </a:fld>
             <a:endParaRPr lang="en-US"/>
           </a:p>
@@ -1692,6 +1708,7 @@
           <a:p>
             <a:fld id="{FA2AA385-65D7-4078-9D43-7BADBAF381FB}" type="slidenum">
               <a:rPr lang="en-US" smtClean="0"/>
+              <a:pPr/>
               <a:t>‹#›</a:t>
             </a:fld>
             <a:endParaRPr lang="en-US"/>
@@ -1770,7 +1787,8 @@
           <a:p>
             <a:fld id="{D192356E-1989-45DF-9A8F-140A23C2747A}" type="datetimeFigureOut">
               <a:rPr lang="en-US" smtClean="0"/>
-              <a:t>11/12/2014</a:t>
+              <a:pPr/>
+              <a:t>2/18/2015</a:t>
             </a:fld>
             <a:endParaRPr lang="en-US"/>
           </a:p>
@@ -1812,6 +1830,7 @@
           <a:p>
             <a:fld id="{FA2AA385-65D7-4078-9D43-7BADBAF381FB}" type="slidenum">
               <a:rPr lang="en-US" smtClean="0"/>
+              <a:pPr/>
               <a:t>‹#›</a:t>
             </a:fld>
             <a:endParaRPr lang="en-US"/>
@@ -1860,7 +1879,8 @@
           <a:p>
             <a:fld id="{D192356E-1989-45DF-9A8F-140A23C2747A}" type="datetimeFigureOut">
               <a:rPr lang="en-US" smtClean="0"/>
-              <a:t>11/12/2014</a:t>
+              <a:pPr/>
+              <a:t>2/18/2015</a:t>
             </a:fld>
             <a:endParaRPr lang="en-US"/>
           </a:p>
@@ -1902,6 +1922,7 @@
           <a:p>
             <a:fld id="{FA2AA385-65D7-4078-9D43-7BADBAF381FB}" type="slidenum">
               <a:rPr lang="en-US" smtClean="0"/>
+              <a:pPr/>
               <a:t>‹#›</a:t>
             </a:fld>
             <a:endParaRPr lang="en-US"/>
@@ -2132,7 +2153,8 @@
           <a:p>
             <a:fld id="{D192356E-1989-45DF-9A8F-140A23C2747A}" type="datetimeFigureOut">
               <a:rPr lang="en-US" smtClean="0"/>
-              <a:t>11/12/2014</a:t>
+              <a:pPr/>
+              <a:t>2/18/2015</a:t>
             </a:fld>
             <a:endParaRPr lang="en-US"/>
           </a:p>
@@ -2174,6 +2196,7 @@
           <a:p>
             <a:fld id="{FA2AA385-65D7-4078-9D43-7BADBAF381FB}" type="slidenum">
               <a:rPr lang="en-US" smtClean="0"/>
+              <a:pPr/>
               <a:t>‹#›</a:t>
             </a:fld>
             <a:endParaRPr lang="en-US"/>
@@ -2387,7 +2410,8 @@
           <a:p>
             <a:fld id="{D192356E-1989-45DF-9A8F-140A23C2747A}" type="datetimeFigureOut">
               <a:rPr lang="en-US" smtClean="0"/>
-              <a:t>11/12/2014</a:t>
+              <a:pPr/>
+              <a:t>2/18/2015</a:t>
             </a:fld>
             <a:endParaRPr lang="en-US"/>
           </a:p>
@@ -2429,6 +2453,7 @@
           <a:p>
             <a:fld id="{FA2AA385-65D7-4078-9D43-7BADBAF381FB}" type="slidenum">
               <a:rPr lang="en-US" smtClean="0"/>
+              <a:pPr/>
               <a:t>‹#›</a:t>
             </a:fld>
             <a:endParaRPr lang="en-US"/>
@@ -2598,7 +2623,8 @@
           <a:p>
             <a:fld id="{D192356E-1989-45DF-9A8F-140A23C2747A}" type="datetimeFigureOut">
               <a:rPr lang="en-US" smtClean="0"/>
-              <a:t>11/12/2014</a:t>
+              <a:pPr/>
+              <a:t>2/18/2015</a:t>
             </a:fld>
             <a:endParaRPr lang="en-US"/>
           </a:p>
@@ -2676,6 +2702,7 @@
           <a:p>
             <a:fld id="{FA2AA385-65D7-4078-9D43-7BADBAF381FB}" type="slidenum">
               <a:rPr lang="en-US" smtClean="0"/>
+              <a:pPr/>
               <a:t>‹#›</a:t>
             </a:fld>
             <a:endParaRPr lang="en-US"/>
@@ -5294,6 +5321,695 @@
 <file path=ppt/slides/slide17.xml><?xml version="1.0" encoding="utf-8"?>
 <p:sld xmlns:a="http://schemas.openxmlformats.org/drawingml/2006/main" xmlns:r="http://schemas.openxmlformats.org/officeDocument/2006/relationships" xmlns:p="http://schemas.openxmlformats.org/presentationml/2006/main">
   <p:cSld>
+    <p:bg>
+      <p:bgPr>
+        <a:solidFill>
+          <a:srgbClr val="780A68"/>
+        </a:solidFill>
+        <a:effectLst/>
+      </p:bgPr>
+    </p:bg>
+    <p:spTree>
+      <p:nvGrpSpPr>
+        <p:cNvPr id="1" name=""/>
+        <p:cNvGrpSpPr/>
+        <p:nvPr/>
+      </p:nvGrpSpPr>
+      <p:grpSpPr>
+        <a:xfrm>
+          <a:off x="0" y="0"/>
+          <a:ext cx="0" cy="0"/>
+          <a:chOff x="0" y="0"/>
+          <a:chExt cx="0" cy="0"/>
+        </a:xfrm>
+      </p:grpSpPr>
+      <p:pic>
+        <p:nvPicPr>
+          <p:cNvPr id="6" name="Picture 5" descr="polygons1.png"/>
+          <p:cNvPicPr>
+            <a:picLocks noChangeAspect="1"/>
+          </p:cNvPicPr>
+          <p:nvPr/>
+        </p:nvPicPr>
+        <p:blipFill>
+          <a:blip r:embed="rId2" cstate="print"/>
+          <a:stretch>
+            <a:fillRect/>
+          </a:stretch>
+        </p:blipFill>
+        <p:spPr>
+          <a:xfrm>
+            <a:off x="1676400" y="1962150"/>
+            <a:ext cx="4953000" cy="2875595"/>
+          </a:xfrm>
+          <a:prstGeom prst="rect">
+            <a:avLst/>
+          </a:prstGeom>
+          <a:solidFill>
+            <a:srgbClr val="FFFFFF">
+              <a:shade val="85000"/>
+            </a:srgbClr>
+          </a:solidFill>
+          <a:ln w="101600" cap="sq">
+            <a:solidFill>
+              <a:srgbClr val="FDFDFD"/>
+            </a:solidFill>
+            <a:miter lim="800000"/>
+          </a:ln>
+          <a:effectLst>
+            <a:outerShdw blurRad="57150" dist="37500" dir="7560000" sy="98000" kx="110000" ky="200000" algn="tl" rotWithShape="0">
+              <a:srgbClr val="000000">
+                <a:alpha val="20000"/>
+              </a:srgbClr>
+            </a:outerShdw>
+          </a:effectLst>
+          <a:scene3d>
+            <a:camera prst="perspectiveRelaxed">
+              <a:rot lat="18960000" lon="0" rev="0"/>
+            </a:camera>
+            <a:lightRig rig="twoPt" dir="t">
+              <a:rot lat="0" lon="0" rev="7200000"/>
+            </a:lightRig>
+          </a:scene3d>
+          <a:sp3d prstMaterial="matte">
+            <a:bevelT w="22860" h="12700"/>
+            <a:contourClr>
+              <a:srgbClr val="FFFFFF"/>
+            </a:contourClr>
+          </a:sp3d>
+        </p:spPr>
+      </p:pic>
+      <p:pic>
+        <p:nvPicPr>
+          <p:cNvPr id="3" name="Picture 2" descr="lines1.png"/>
+          <p:cNvPicPr>
+            <a:picLocks noChangeAspect="1"/>
+          </p:cNvPicPr>
+          <p:nvPr/>
+        </p:nvPicPr>
+        <p:blipFill>
+          <a:blip r:embed="rId3" cstate="print"/>
+          <a:stretch>
+            <a:fillRect/>
+          </a:stretch>
+        </p:blipFill>
+        <p:spPr>
+          <a:xfrm>
+            <a:off x="533400" y="438150"/>
+            <a:ext cx="4419600" cy="2565915"/>
+          </a:xfrm>
+          <a:prstGeom prst="rect">
+            <a:avLst/>
+          </a:prstGeom>
+          <a:solidFill>
+            <a:srgbClr val="FFFFFF">
+              <a:shade val="85000"/>
+            </a:srgbClr>
+          </a:solidFill>
+          <a:ln w="101600" cap="sq">
+            <a:solidFill>
+              <a:srgbClr val="FDFDFD"/>
+            </a:solidFill>
+            <a:miter lim="800000"/>
+          </a:ln>
+          <a:effectLst>
+            <a:outerShdw blurRad="57150" dist="37500" dir="7560000" sy="98000" kx="110000" ky="200000" algn="tl" rotWithShape="0">
+              <a:srgbClr val="000000">
+                <a:alpha val="20000"/>
+              </a:srgbClr>
+            </a:outerShdw>
+          </a:effectLst>
+          <a:scene3d>
+            <a:camera prst="perspectiveRelaxed">
+              <a:rot lat="18960000" lon="0" rev="0"/>
+            </a:camera>
+            <a:lightRig rig="twoPt" dir="t">
+              <a:rot lat="0" lon="0" rev="7200000"/>
+            </a:lightRig>
+          </a:scene3d>
+          <a:sp3d prstMaterial="matte">
+            <a:bevelT w="22860" h="12700"/>
+            <a:contourClr>
+              <a:srgbClr val="FFFFFF"/>
+            </a:contourClr>
+          </a:sp3d>
+        </p:spPr>
+      </p:pic>
+      <p:pic>
+        <p:nvPicPr>
+          <p:cNvPr id="5" name="Picture 4" descr="points1.png"/>
+          <p:cNvPicPr>
+            <a:picLocks noChangeAspect="1"/>
+          </p:cNvPicPr>
+          <p:nvPr/>
+        </p:nvPicPr>
+        <p:blipFill>
+          <a:blip r:embed="rId4" cstate="print"/>
+          <a:stretch>
+            <a:fillRect/>
+          </a:stretch>
+        </p:blipFill>
+        <p:spPr>
+          <a:xfrm>
+            <a:off x="3886200" y="742950"/>
+            <a:ext cx="4527138" cy="2628349"/>
+          </a:xfrm>
+          <a:prstGeom prst="rect">
+            <a:avLst/>
+          </a:prstGeom>
+          <a:solidFill>
+            <a:srgbClr val="FFFFFF">
+              <a:shade val="85000"/>
+            </a:srgbClr>
+          </a:solidFill>
+          <a:ln w="101600" cap="sq">
+            <a:solidFill>
+              <a:srgbClr val="FDFDFD"/>
+            </a:solidFill>
+            <a:miter lim="800000"/>
+          </a:ln>
+          <a:effectLst>
+            <a:outerShdw blurRad="57150" dist="37500" dir="7560000" sy="98000" kx="110000" ky="200000" algn="tl" rotWithShape="0">
+              <a:srgbClr val="000000">
+                <a:alpha val="20000"/>
+              </a:srgbClr>
+            </a:outerShdw>
+          </a:effectLst>
+          <a:scene3d>
+            <a:camera prst="perspectiveRelaxed">
+              <a:rot lat="18960000" lon="0" rev="0"/>
+            </a:camera>
+            <a:lightRig rig="twoPt" dir="t">
+              <a:rot lat="0" lon="0" rev="7200000"/>
+            </a:lightRig>
+          </a:scene3d>
+          <a:sp3d prstMaterial="matte">
+            <a:bevelT w="22860" h="12700"/>
+            <a:contourClr>
+              <a:srgbClr val="FFFFFF"/>
+            </a:contourClr>
+          </a:sp3d>
+        </p:spPr>
+      </p:pic>
+      <p:pic>
+        <p:nvPicPr>
+          <p:cNvPr id="7" name="Picture 6" descr="tile.png"/>
+          <p:cNvPicPr>
+            <a:picLocks noChangeAspect="1"/>
+          </p:cNvPicPr>
+          <p:nvPr/>
+        </p:nvPicPr>
+        <p:blipFill>
+          <a:blip r:embed="rId5" cstate="print"/>
+          <a:stretch>
+            <a:fillRect/>
+          </a:stretch>
+        </p:blipFill>
+        <p:spPr>
+          <a:xfrm>
+            <a:off x="381000" y="1809750"/>
+            <a:ext cx="2914650" cy="2933700"/>
+          </a:xfrm>
+          <a:prstGeom prst="rect">
+            <a:avLst/>
+          </a:prstGeom>
+          <a:solidFill>
+            <a:srgbClr val="FFFFFF">
+              <a:shade val="85000"/>
+            </a:srgbClr>
+          </a:solidFill>
+          <a:ln w="101600" cap="sq">
+            <a:solidFill>
+              <a:srgbClr val="FDFDFD"/>
+            </a:solidFill>
+            <a:miter lim="800000"/>
+          </a:ln>
+          <a:effectLst>
+            <a:outerShdw blurRad="57150" dist="37500" dir="7560000" sy="98000" kx="110000" ky="200000" algn="tl" rotWithShape="0">
+              <a:srgbClr val="000000">
+                <a:alpha val="20000"/>
+              </a:srgbClr>
+            </a:outerShdw>
+          </a:effectLst>
+          <a:scene3d>
+            <a:camera prst="perspectiveRelaxed">
+              <a:rot lat="18960000" lon="0" rev="0"/>
+            </a:camera>
+            <a:lightRig rig="twoPt" dir="t">
+              <a:rot lat="0" lon="0" rev="7200000"/>
+            </a:lightRig>
+          </a:scene3d>
+          <a:sp3d prstMaterial="matte">
+            <a:bevelT w="22860" h="12700"/>
+            <a:contourClr>
+              <a:srgbClr val="FFFFFF"/>
+            </a:contourClr>
+          </a:sp3d>
+        </p:spPr>
+      </p:pic>
+      <p:pic>
+        <p:nvPicPr>
+          <p:cNvPr id="8" name="Picture 7" descr="tile.png"/>
+          <p:cNvPicPr>
+            <a:picLocks noChangeAspect="1"/>
+          </p:cNvPicPr>
+          <p:nvPr/>
+        </p:nvPicPr>
+        <p:blipFill>
+          <a:blip r:embed="rId5" cstate="print"/>
+          <a:stretch>
+            <a:fillRect/>
+          </a:stretch>
+        </p:blipFill>
+        <p:spPr>
+          <a:xfrm>
+            <a:off x="2895600" y="1581150"/>
+            <a:ext cx="2914650" cy="2933700"/>
+          </a:xfrm>
+          <a:prstGeom prst="rect">
+            <a:avLst/>
+          </a:prstGeom>
+          <a:solidFill>
+            <a:srgbClr val="FFFFFF">
+              <a:shade val="85000"/>
+            </a:srgbClr>
+          </a:solidFill>
+          <a:ln w="101600" cap="sq">
+            <a:solidFill>
+              <a:srgbClr val="FDFDFD"/>
+            </a:solidFill>
+            <a:miter lim="800000"/>
+          </a:ln>
+          <a:effectLst>
+            <a:outerShdw blurRad="57150" dist="37500" dir="7560000" sy="98000" kx="110000" ky="200000" algn="tl" rotWithShape="0">
+              <a:srgbClr val="000000">
+                <a:alpha val="20000"/>
+              </a:srgbClr>
+            </a:outerShdw>
+          </a:effectLst>
+          <a:scene3d>
+            <a:camera prst="perspectiveRelaxed">
+              <a:rot lat="18960000" lon="0" rev="0"/>
+            </a:camera>
+            <a:lightRig rig="twoPt" dir="t">
+              <a:rot lat="0" lon="0" rev="7200000"/>
+            </a:lightRig>
+          </a:scene3d>
+          <a:sp3d prstMaterial="matte">
+            <a:bevelT w="22860" h="12700"/>
+            <a:contourClr>
+              <a:srgbClr val="FFFFFF"/>
+            </a:contourClr>
+          </a:sp3d>
+        </p:spPr>
+      </p:pic>
+      <p:pic>
+        <p:nvPicPr>
+          <p:cNvPr id="9" name="Picture 8" descr="tile.png"/>
+          <p:cNvPicPr>
+            <a:picLocks noChangeAspect="1"/>
+          </p:cNvPicPr>
+          <p:nvPr/>
+        </p:nvPicPr>
+        <p:blipFill>
+          <a:blip r:embed="rId5" cstate="print"/>
+          <a:stretch>
+            <a:fillRect/>
+          </a:stretch>
+        </p:blipFill>
+        <p:spPr>
+          <a:xfrm>
+            <a:off x="5486400" y="1504950"/>
+            <a:ext cx="2914650" cy="2933700"/>
+          </a:xfrm>
+          <a:prstGeom prst="rect">
+            <a:avLst/>
+          </a:prstGeom>
+          <a:solidFill>
+            <a:srgbClr val="FFFFFF">
+              <a:shade val="85000"/>
+            </a:srgbClr>
+          </a:solidFill>
+          <a:ln w="101600" cap="sq">
+            <a:solidFill>
+              <a:srgbClr val="FDFDFD"/>
+            </a:solidFill>
+            <a:miter lim="800000"/>
+          </a:ln>
+          <a:effectLst>
+            <a:outerShdw blurRad="57150" dist="37500" dir="7560000" sy="98000" kx="110000" ky="200000" algn="tl" rotWithShape="0">
+              <a:srgbClr val="000000">
+                <a:alpha val="20000"/>
+              </a:srgbClr>
+            </a:outerShdw>
+          </a:effectLst>
+          <a:scene3d>
+            <a:camera prst="perspectiveRelaxed">
+              <a:rot lat="18960000" lon="0" rev="0"/>
+            </a:camera>
+            <a:lightRig rig="twoPt" dir="t">
+              <a:rot lat="0" lon="0" rev="7200000"/>
+            </a:lightRig>
+          </a:scene3d>
+          <a:sp3d prstMaterial="matte">
+            <a:bevelT w="22860" h="12700"/>
+            <a:contourClr>
+              <a:srgbClr val="FFFFFF"/>
+            </a:contourClr>
+          </a:sp3d>
+        </p:spPr>
+      </p:pic>
+    </p:spTree>
+  </p:cSld>
+  <p:clrMapOvr>
+    <a:masterClrMapping/>
+  </p:clrMapOvr>
+  <p:timing>
+    <p:tnLst>
+      <p:par>
+        <p:cTn id="1" dur="indefinite" restart="never" nodeType="tmRoot">
+          <p:childTnLst>
+            <p:seq concurrent="1" nextAc="seek">
+              <p:cTn id="2" dur="indefinite" nodeType="mainSeq">
+                <p:childTnLst>
+                  <p:par>
+                    <p:cTn id="3" fill="hold">
+                      <p:stCondLst>
+                        <p:cond delay="indefinite"/>
+                      </p:stCondLst>
+                      <p:childTnLst>
+                        <p:par>
+                          <p:cTn id="4" fill="hold">
+                            <p:stCondLst>
+                              <p:cond delay="0"/>
+                            </p:stCondLst>
+                            <p:childTnLst>
+                              <p:par>
+                                <p:cTn id="5" presetID="10" presetClass="entr" presetSubtype="0" fill="hold" nodeType="clickEffect">
+                                  <p:stCondLst>
+                                    <p:cond delay="0"/>
+                                  </p:stCondLst>
+                                  <p:childTnLst>
+                                    <p:set>
+                                      <p:cBhvr>
+                                        <p:cTn id="6" dur="1" fill="hold">
+                                          <p:stCondLst>
+                                            <p:cond delay="0"/>
+                                          </p:stCondLst>
+                                        </p:cTn>
+                                        <p:tgtEl>
+                                          <p:spTgt spid="6"/>
+                                        </p:tgtEl>
+                                        <p:attrNameLst>
+                                          <p:attrName>style.visibility</p:attrName>
+                                        </p:attrNameLst>
+                                      </p:cBhvr>
+                                      <p:to>
+                                        <p:strVal val="visible"/>
+                                      </p:to>
+                                    </p:set>
+                                    <p:animEffect transition="in" filter="fade">
+                                      <p:cBhvr>
+                                        <p:cTn id="7" dur="500"/>
+                                        <p:tgtEl>
+                                          <p:spTgt spid="6"/>
+                                        </p:tgtEl>
+                                      </p:cBhvr>
+                                    </p:animEffect>
+                                  </p:childTnLst>
+                                </p:cTn>
+                              </p:par>
+                            </p:childTnLst>
+                          </p:cTn>
+                        </p:par>
+                      </p:childTnLst>
+                    </p:cTn>
+                  </p:par>
+                  <p:par>
+                    <p:cTn id="8" fill="hold">
+                      <p:stCondLst>
+                        <p:cond delay="indefinite"/>
+                      </p:stCondLst>
+                      <p:childTnLst>
+                        <p:par>
+                          <p:cTn id="9" fill="hold">
+                            <p:stCondLst>
+                              <p:cond delay="0"/>
+                            </p:stCondLst>
+                            <p:childTnLst>
+                              <p:par>
+                                <p:cTn id="10" presetID="10" presetClass="entr" presetSubtype="0" fill="hold" nodeType="clickEffect">
+                                  <p:stCondLst>
+                                    <p:cond delay="0"/>
+                                  </p:stCondLst>
+                                  <p:childTnLst>
+                                    <p:set>
+                                      <p:cBhvr>
+                                        <p:cTn id="11" dur="1" fill="hold">
+                                          <p:stCondLst>
+                                            <p:cond delay="0"/>
+                                          </p:stCondLst>
+                                        </p:cTn>
+                                        <p:tgtEl>
+                                          <p:spTgt spid="3"/>
+                                        </p:tgtEl>
+                                        <p:attrNameLst>
+                                          <p:attrName>style.visibility</p:attrName>
+                                        </p:attrNameLst>
+                                      </p:cBhvr>
+                                      <p:to>
+                                        <p:strVal val="visible"/>
+                                      </p:to>
+                                    </p:set>
+                                    <p:animEffect transition="in" filter="fade">
+                                      <p:cBhvr>
+                                        <p:cTn id="12" dur="500"/>
+                                        <p:tgtEl>
+                                          <p:spTgt spid="3"/>
+                                        </p:tgtEl>
+                                      </p:cBhvr>
+                                    </p:animEffect>
+                                  </p:childTnLst>
+                                </p:cTn>
+                              </p:par>
+                            </p:childTnLst>
+                          </p:cTn>
+                        </p:par>
+                      </p:childTnLst>
+                    </p:cTn>
+                  </p:par>
+                  <p:par>
+                    <p:cTn id="13" fill="hold">
+                      <p:stCondLst>
+                        <p:cond delay="indefinite"/>
+                      </p:stCondLst>
+                      <p:childTnLst>
+                        <p:par>
+                          <p:cTn id="14" fill="hold">
+                            <p:stCondLst>
+                              <p:cond delay="0"/>
+                            </p:stCondLst>
+                            <p:childTnLst>
+                              <p:par>
+                                <p:cTn id="15" presetID="10" presetClass="entr" presetSubtype="0" fill="hold" nodeType="clickEffect">
+                                  <p:stCondLst>
+                                    <p:cond delay="0"/>
+                                  </p:stCondLst>
+                                  <p:childTnLst>
+                                    <p:set>
+                                      <p:cBhvr>
+                                        <p:cTn id="16" dur="1" fill="hold">
+                                          <p:stCondLst>
+                                            <p:cond delay="0"/>
+                                          </p:stCondLst>
+                                        </p:cTn>
+                                        <p:tgtEl>
+                                          <p:spTgt spid="5"/>
+                                        </p:tgtEl>
+                                        <p:attrNameLst>
+                                          <p:attrName>style.visibility</p:attrName>
+                                        </p:attrNameLst>
+                                      </p:cBhvr>
+                                      <p:to>
+                                        <p:strVal val="visible"/>
+                                      </p:to>
+                                    </p:set>
+                                    <p:animEffect transition="in" filter="fade">
+                                      <p:cBhvr>
+                                        <p:cTn id="17" dur="500"/>
+                                        <p:tgtEl>
+                                          <p:spTgt spid="5"/>
+                                        </p:tgtEl>
+                                      </p:cBhvr>
+                                    </p:animEffect>
+                                  </p:childTnLst>
+                                </p:cTn>
+                              </p:par>
+                            </p:childTnLst>
+                          </p:cTn>
+                        </p:par>
+                      </p:childTnLst>
+                    </p:cTn>
+                  </p:par>
+                  <p:par>
+                    <p:cTn id="18" fill="hold">
+                      <p:stCondLst>
+                        <p:cond delay="indefinite"/>
+                      </p:stCondLst>
+                      <p:childTnLst>
+                        <p:par>
+                          <p:cTn id="19" fill="hold">
+                            <p:stCondLst>
+                              <p:cond delay="0"/>
+                            </p:stCondLst>
+                            <p:childTnLst>
+                              <p:par>
+                                <p:cTn id="20" presetID="10" presetClass="entr" presetSubtype="0" fill="hold" nodeType="clickEffect">
+                                  <p:stCondLst>
+                                    <p:cond delay="0"/>
+                                  </p:stCondLst>
+                                  <p:childTnLst>
+                                    <p:set>
+                                      <p:cBhvr>
+                                        <p:cTn id="21" dur="1" fill="hold">
+                                          <p:stCondLst>
+                                            <p:cond delay="0"/>
+                                          </p:stCondLst>
+                                        </p:cTn>
+                                        <p:tgtEl>
+                                          <p:spTgt spid="7"/>
+                                        </p:tgtEl>
+                                        <p:attrNameLst>
+                                          <p:attrName>style.visibility</p:attrName>
+                                        </p:attrNameLst>
+                                      </p:cBhvr>
+                                      <p:to>
+                                        <p:strVal val="visible"/>
+                                      </p:to>
+                                    </p:set>
+                                    <p:animEffect transition="in" filter="fade">
+                                      <p:cBhvr>
+                                        <p:cTn id="22" dur="500"/>
+                                        <p:tgtEl>
+                                          <p:spTgt spid="7"/>
+                                        </p:tgtEl>
+                                      </p:cBhvr>
+                                    </p:animEffect>
+                                  </p:childTnLst>
+                                </p:cTn>
+                              </p:par>
+                              <p:par>
+                                <p:cTn id="23" presetID="10" presetClass="entr" presetSubtype="0" fill="hold" nodeType="withEffect">
+                                  <p:stCondLst>
+                                    <p:cond delay="0"/>
+                                  </p:stCondLst>
+                                  <p:childTnLst>
+                                    <p:set>
+                                      <p:cBhvr>
+                                        <p:cTn id="24" dur="1" fill="hold">
+                                          <p:stCondLst>
+                                            <p:cond delay="0"/>
+                                          </p:stCondLst>
+                                        </p:cTn>
+                                        <p:tgtEl>
+                                          <p:spTgt spid="8"/>
+                                        </p:tgtEl>
+                                        <p:attrNameLst>
+                                          <p:attrName>style.visibility</p:attrName>
+                                        </p:attrNameLst>
+                                      </p:cBhvr>
+                                      <p:to>
+                                        <p:strVal val="visible"/>
+                                      </p:to>
+                                    </p:set>
+                                    <p:animEffect transition="in" filter="fade">
+                                      <p:cBhvr>
+                                        <p:cTn id="25" dur="500"/>
+                                        <p:tgtEl>
+                                          <p:spTgt spid="8"/>
+                                        </p:tgtEl>
+                                      </p:cBhvr>
+                                    </p:animEffect>
+                                  </p:childTnLst>
+                                </p:cTn>
+                              </p:par>
+                              <p:par>
+                                <p:cTn id="26" presetID="10" presetClass="entr" presetSubtype="0" fill="hold" nodeType="withEffect">
+                                  <p:stCondLst>
+                                    <p:cond delay="0"/>
+                                  </p:stCondLst>
+                                  <p:childTnLst>
+                                    <p:set>
+                                      <p:cBhvr>
+                                        <p:cTn id="27" dur="1" fill="hold">
+                                          <p:stCondLst>
+                                            <p:cond delay="0"/>
+                                          </p:stCondLst>
+                                        </p:cTn>
+                                        <p:tgtEl>
+                                          <p:spTgt spid="9"/>
+                                        </p:tgtEl>
+                                        <p:attrNameLst>
+                                          <p:attrName>style.visibility</p:attrName>
+                                        </p:attrNameLst>
+                                      </p:cBhvr>
+                                      <p:to>
+                                        <p:strVal val="visible"/>
+                                      </p:to>
+                                    </p:set>
+                                    <p:animEffect transition="in" filter="fade">
+                                      <p:cBhvr>
+                                        <p:cTn id="28" dur="500"/>
+                                        <p:tgtEl>
+                                          <p:spTgt spid="9"/>
+                                        </p:tgtEl>
+                                      </p:cBhvr>
+                                    </p:animEffect>
+                                  </p:childTnLst>
+                                </p:cTn>
+                              </p:par>
+                            </p:childTnLst>
+                          </p:cTn>
+                        </p:par>
+                      </p:childTnLst>
+                    </p:cTn>
+                  </p:par>
+                </p:childTnLst>
+              </p:cTn>
+              <p:prevCondLst>
+                <p:cond evt="onPrev" delay="0">
+                  <p:tgtEl>
+                    <p:sldTgt/>
+                  </p:tgtEl>
+                </p:cond>
+              </p:prevCondLst>
+              <p:nextCondLst>
+                <p:cond evt="onNext" delay="0">
+                  <p:tgtEl>
+                    <p:sldTgt/>
+                  </p:tgtEl>
+                </p:cond>
+              </p:nextCondLst>
+            </p:seq>
+          </p:childTnLst>
+        </p:cTn>
+      </p:par>
+    </p:tnLst>
+  </p:timing>
+</p:sld>
+</file>
+
+<file path=ppt/slides/slide18.xml><?xml version="1.0" encoding="utf-8"?>
+<p:sld xmlns:a="http://schemas.openxmlformats.org/drawingml/2006/main" xmlns:r="http://schemas.openxmlformats.org/officeDocument/2006/relationships" xmlns:p="http://schemas.openxmlformats.org/presentationml/2006/main">
+  <p:cSld>
+    <p:bg>
+      <p:bgPr>
+        <a:solidFill>
+          <a:srgbClr val="780A68"/>
+        </a:solidFill>
+        <a:effectLst/>
+      </p:bgPr>
+    </p:bg>
     <p:spTree>
       <p:nvGrpSpPr>
         <p:cNvPr id="1" name=""/>
@@ -5310,103 +6026,43 @@
       </p:grpSpPr>
       <p:sp>
         <p:nvSpPr>
-          <p:cNvPr id="2" name="Title 1"/>
+          <p:cNvPr id="4" name="Content Placeholder 2"/>
           <p:cNvSpPr>
             <a:spLocks noGrp="1"/>
           </p:cNvSpPr>
           <p:nvPr>
-            <p:ph type="title"/>
+            <p:ph sz="half" idx="1"/>
           </p:nvPr>
         </p:nvSpPr>
-        <p:spPr/>
+        <p:spPr>
+          <a:xfrm>
+            <a:off x="3124200" y="1581150"/>
+            <a:ext cx="5562600" cy="3124199"/>
+          </a:xfrm>
+        </p:spPr>
         <p:txBody>
           <a:bodyPr>
-            <a:normAutofit/>
+            <a:noAutofit/>
           </a:bodyPr>
           <a:lstStyle/>
           <a:p>
             <a:r>
-              <a:rPr lang="en-US" sz="6000" dirty="0" smtClean="0"/>
-              <a:t>Let’s Make A Map!</a:t>
-            </a:r>
-            <a:endParaRPr lang="en-US" sz="6000" dirty="0"/>
-          </a:p>
-        </p:txBody>
-      </p:sp>
-    </p:spTree>
-  </p:cSld>
-  <p:clrMapOvr>
-    <a:masterClrMapping/>
-  </p:clrMapOvr>
-  <p:timing>
-    <p:tnLst>
-      <p:par>
-        <p:cTn id="1" dur="indefinite" restart="never" nodeType="tmRoot"/>
-      </p:par>
-    </p:tnLst>
-  </p:timing>
-</p:sld>
-</file>
-
-<file path=ppt/slides/slide18.xml><?xml version="1.0" encoding="utf-8"?>
-<p:sld xmlns:a="http://schemas.openxmlformats.org/drawingml/2006/main" xmlns:r="http://schemas.openxmlformats.org/officeDocument/2006/relationships" xmlns:p="http://schemas.openxmlformats.org/presentationml/2006/main">
-  <p:cSld>
-    <p:spTree>
-      <p:nvGrpSpPr>
-        <p:cNvPr id="1" name=""/>
-        <p:cNvGrpSpPr/>
-        <p:nvPr/>
-      </p:nvGrpSpPr>
-      <p:grpSpPr>
-        <a:xfrm>
-          <a:off x="0" y="0"/>
-          <a:ext cx="0" cy="0"/>
-          <a:chOff x="0" y="0"/>
-          <a:chExt cx="0" cy="0"/>
-        </a:xfrm>
-      </p:grpSpPr>
-      <p:sp>
-        <p:nvSpPr>
-          <p:cNvPr id="2" name="Title 1"/>
-          <p:cNvSpPr>
-            <a:spLocks noGrp="1"/>
-          </p:cNvSpPr>
-          <p:nvPr>
-            <p:ph type="title"/>
-          </p:nvPr>
-        </p:nvSpPr>
-        <p:spPr/>
-        <p:txBody>
-          <a:bodyPr/>
-          <a:lstStyle/>
-          <a:p>
-            <a:r>
-              <a:rPr lang="en-US" dirty="0" smtClean="0"/>
-              <a:t>Base Map</a:t>
-            </a:r>
-            <a:br>
-              <a:rPr lang="en-US" dirty="0" smtClean="0"/>
-            </a:br>
-            <a:r>
-              <a:rPr lang="en-US" dirty="0" smtClean="0"/>
-              <a:t/>
-            </a:r>
-            <a:br>
-              <a:rPr lang="en-US" dirty="0" smtClean="0"/>
-            </a:br>
-            <a:r>
-              <a:rPr lang="en-US" sz="4800" i="1" dirty="0" smtClean="0">
-                <a:solidFill>
-                  <a:srgbClr val="FF66CC"/>
-                </a:solidFill>
-              </a:rPr>
-              <a:t>mapbox.com</a:t>
-            </a:r>
-            <a:endParaRPr lang="en-US" i="1" dirty="0">
-              <a:solidFill>
-                <a:srgbClr val="FF66CC"/>
-              </a:solidFill>
-            </a:endParaRPr>
+              <a:rPr lang="en-US" sz="3600" dirty="0" smtClean="0"/>
+              <a:t>SVG</a:t>
+            </a:r>
+          </a:p>
+          <a:p>
+            <a:r>
+              <a:rPr lang="en-US" sz="3600" dirty="0" smtClean="0"/>
+              <a:t>Canvas</a:t>
+            </a:r>
+          </a:p>
+          <a:p>
+            <a:r>
+              <a:rPr lang="en-US" sz="3600" dirty="0" smtClean="0"/>
+              <a:t>Plain Images…</a:t>
+            </a:r>
+            <a:endParaRPr lang="en-US" sz="3600" dirty="0"/>
           </a:p>
         </p:txBody>
       </p:sp>
@@ -5428,6 +6084,14 @@
 <file path=ppt/slides/slide19.xml><?xml version="1.0" encoding="utf-8"?>
 <p:sld xmlns:a="http://schemas.openxmlformats.org/drawingml/2006/main" xmlns:r="http://schemas.openxmlformats.org/officeDocument/2006/relationships" xmlns:p="http://schemas.openxmlformats.org/presentationml/2006/main">
   <p:cSld>
+    <p:bg>
+      <p:bgPr>
+        <a:solidFill>
+          <a:srgbClr val="780A68"/>
+        </a:solidFill>
+        <a:effectLst/>
+      </p:bgPr>
+    </p:bg>
     <p:spTree>
       <p:nvGrpSpPr>
         <p:cNvPr id="1" name=""/>
@@ -5442,51 +6106,118 @@
           <a:chExt cx="0" cy="0"/>
         </a:xfrm>
       </p:grpSpPr>
-      <p:sp>
-        <p:nvSpPr>
-          <p:cNvPr id="2" name="Title 1"/>
-          <p:cNvSpPr>
-            <a:spLocks noGrp="1"/>
-          </p:cNvSpPr>
-          <p:nvPr>
-            <p:ph type="title"/>
-          </p:nvPr>
-        </p:nvSpPr>
-        <p:spPr/>
-        <p:txBody>
-          <a:bodyPr/>
-          <a:lstStyle/>
-          <a:p>
-            <a:r>
-              <a:rPr lang="en-US" dirty="0" smtClean="0"/>
-              <a:t>Hosting</a:t>
-            </a:r>
-            <a:br>
-              <a:rPr lang="en-US" dirty="0" smtClean="0"/>
-            </a:br>
-            <a:r>
-              <a:rPr lang="en-US" dirty="0"/>
-              <a:t/>
-            </a:r>
-            <a:br>
-              <a:rPr lang="en-US" dirty="0"/>
-            </a:br>
-            <a:r>
-              <a:rPr lang="en-US" sz="4800" i="1" dirty="0" smtClean="0">
-                <a:solidFill>
-                  <a:srgbClr val="FF66CC"/>
-                </a:solidFill>
-              </a:rPr>
-              <a:t>github.com</a:t>
-            </a:r>
-            <a:endParaRPr lang="en-US" i="1" dirty="0">
-              <a:solidFill>
-                <a:srgbClr val="FF66CC"/>
-              </a:solidFill>
-            </a:endParaRPr>
-          </a:p>
-        </p:txBody>
-      </p:sp>
+      <p:pic>
+        <p:nvPicPr>
+          <p:cNvPr id="6" name="Picture 5" descr="browser1.png"/>
+          <p:cNvPicPr>
+            <a:picLocks noChangeAspect="1"/>
+          </p:cNvPicPr>
+          <p:nvPr/>
+        </p:nvPicPr>
+        <p:blipFill>
+          <a:blip r:embed="rId2" cstate="print"/>
+          <a:stretch>
+            <a:fillRect/>
+          </a:stretch>
+        </p:blipFill>
+        <p:spPr>
+          <a:xfrm>
+            <a:off x="152400" y="0"/>
+            <a:ext cx="8859301" cy="5143500"/>
+          </a:xfrm>
+          <a:prstGeom prst="rect">
+            <a:avLst/>
+          </a:prstGeom>
+        </p:spPr>
+      </p:pic>
+      <p:pic>
+        <p:nvPicPr>
+          <p:cNvPr id="7" name="Picture 6" descr="browser2.png"/>
+          <p:cNvPicPr>
+            <a:picLocks noChangeAspect="1"/>
+          </p:cNvPicPr>
+          <p:nvPr/>
+        </p:nvPicPr>
+        <p:blipFill>
+          <a:blip r:embed="rId3" cstate="print"/>
+          <a:stretch>
+            <a:fillRect/>
+          </a:stretch>
+        </p:blipFill>
+        <p:spPr>
+          <a:xfrm>
+            <a:off x="152400" y="0"/>
+            <a:ext cx="8859301" cy="5143500"/>
+          </a:xfrm>
+          <a:prstGeom prst="rect">
+            <a:avLst/>
+          </a:prstGeom>
+        </p:spPr>
+      </p:pic>
+      <p:pic>
+        <p:nvPicPr>
+          <p:cNvPr id="1031" name="Picture 7"/>
+          <p:cNvPicPr>
+            <a:picLocks noChangeAspect="1" noChangeArrowheads="1"/>
+          </p:cNvPicPr>
+          <p:nvPr/>
+        </p:nvPicPr>
+        <p:blipFill>
+          <a:blip r:embed="rId4" cstate="print"/>
+          <a:srcRect/>
+          <a:stretch>
+            <a:fillRect/>
+          </a:stretch>
+        </p:blipFill>
+        <p:spPr bwMode="auto">
+          <a:xfrm>
+            <a:off x="381000" y="530976"/>
+            <a:ext cx="8413782" cy="4419600"/>
+          </a:xfrm>
+          <a:prstGeom prst="rect">
+            <a:avLst/>
+          </a:prstGeom>
+          <a:noFill/>
+          <a:ln w="9525">
+            <a:noFill/>
+            <a:miter lim="800000"/>
+            <a:headEnd/>
+            <a:tailEnd/>
+          </a:ln>
+        </p:spPr>
+      </p:pic>
+      <p:pic>
+        <p:nvPicPr>
+          <p:cNvPr id="1032" name="Picture 8"/>
+          <p:cNvPicPr>
+            <a:picLocks noChangeAspect="1" noChangeArrowheads="1"/>
+          </p:cNvPicPr>
+          <p:nvPr/>
+        </p:nvPicPr>
+        <p:blipFill>
+          <a:blip r:embed="rId5" cstate="print"/>
+          <a:srcRect/>
+          <a:stretch>
+            <a:fillRect/>
+          </a:stretch>
+        </p:blipFill>
+        <p:spPr bwMode="auto">
+          <a:xfrm>
+            <a:off x="381000" y="522663"/>
+            <a:ext cx="8405906" cy="4419600"/>
+          </a:xfrm>
+          <a:prstGeom prst="rect">
+            <a:avLst/>
+          </a:prstGeom>
+          <a:noFill/>
+          <a:ln w="9525">
+            <a:noFill/>
+            <a:miter lim="800000"/>
+            <a:headEnd/>
+            <a:tailEnd/>
+          </a:ln>
+        </p:spPr>
+      </p:pic>
     </p:spTree>
   </p:cSld>
   <p:clrMapOvr>
@@ -5495,7 +6226,189 @@
   <p:timing>
     <p:tnLst>
       <p:par>
-        <p:cTn id="1" dur="indefinite" restart="never" nodeType="tmRoot"/>
+        <p:cTn id="1" dur="indefinite" restart="never" nodeType="tmRoot">
+          <p:childTnLst>
+            <p:seq concurrent="1" nextAc="seek">
+              <p:cTn id="2" dur="indefinite" nodeType="mainSeq">
+                <p:childTnLst>
+                  <p:par>
+                    <p:cTn id="3" fill="hold">
+                      <p:stCondLst>
+                        <p:cond delay="indefinite"/>
+                      </p:stCondLst>
+                      <p:childTnLst>
+                        <p:par>
+                          <p:cTn id="4" fill="hold">
+                            <p:stCondLst>
+                              <p:cond delay="0"/>
+                            </p:stCondLst>
+                            <p:childTnLst>
+                              <p:par>
+                                <p:cTn id="5" presetID="22" presetClass="entr" presetSubtype="8" fill="hold" nodeType="clickEffect">
+                                  <p:stCondLst>
+                                    <p:cond delay="0"/>
+                                  </p:stCondLst>
+                                  <p:childTnLst>
+                                    <p:set>
+                                      <p:cBhvr>
+                                        <p:cTn id="6" dur="1" fill="hold">
+                                          <p:stCondLst>
+                                            <p:cond delay="0"/>
+                                          </p:stCondLst>
+                                        </p:cTn>
+                                        <p:tgtEl>
+                                          <p:spTgt spid="7"/>
+                                        </p:tgtEl>
+                                        <p:attrNameLst>
+                                          <p:attrName>style.visibility</p:attrName>
+                                        </p:attrNameLst>
+                                      </p:cBhvr>
+                                      <p:to>
+                                        <p:strVal val="visible"/>
+                                      </p:to>
+                                    </p:set>
+                                    <p:animEffect transition="in" filter="wipe(left)">
+                                      <p:cBhvr>
+                                        <p:cTn id="7" dur="500"/>
+                                        <p:tgtEl>
+                                          <p:spTgt spid="7"/>
+                                        </p:tgtEl>
+                                      </p:cBhvr>
+                                    </p:animEffect>
+                                  </p:childTnLst>
+                                </p:cTn>
+                              </p:par>
+                            </p:childTnLst>
+                          </p:cTn>
+                        </p:par>
+                      </p:childTnLst>
+                    </p:cTn>
+                  </p:par>
+                  <p:par>
+                    <p:cTn id="8" fill="hold">
+                      <p:stCondLst>
+                        <p:cond delay="indefinite"/>
+                      </p:stCondLst>
+                      <p:childTnLst>
+                        <p:par>
+                          <p:cTn id="9" fill="hold">
+                            <p:stCondLst>
+                              <p:cond delay="0"/>
+                            </p:stCondLst>
+                            <p:childTnLst>
+                              <p:par>
+                                <p:cTn id="10" presetID="10" presetClass="entr" presetSubtype="0" fill="hold" nodeType="clickEffect">
+                                  <p:stCondLst>
+                                    <p:cond delay="0"/>
+                                  </p:stCondLst>
+                                  <p:childTnLst>
+                                    <p:set>
+                                      <p:cBhvr>
+                                        <p:cTn id="11" dur="1" fill="hold">
+                                          <p:stCondLst>
+                                            <p:cond delay="0"/>
+                                          </p:stCondLst>
+                                        </p:cTn>
+                                        <p:tgtEl>
+                                          <p:spTgt spid="1031"/>
+                                        </p:tgtEl>
+                                        <p:attrNameLst>
+                                          <p:attrName>style.visibility</p:attrName>
+                                        </p:attrNameLst>
+                                      </p:cBhvr>
+                                      <p:to>
+                                        <p:strVal val="visible"/>
+                                      </p:to>
+                                    </p:set>
+                                    <p:animEffect transition="in" filter="fade">
+                                      <p:cBhvr>
+                                        <p:cTn id="12" dur="500"/>
+                                        <p:tgtEl>
+                                          <p:spTgt spid="1031"/>
+                                        </p:tgtEl>
+                                      </p:cBhvr>
+                                    </p:animEffect>
+                                  </p:childTnLst>
+                                </p:cTn>
+                              </p:par>
+                            </p:childTnLst>
+                          </p:cTn>
+                        </p:par>
+                      </p:childTnLst>
+                    </p:cTn>
+                  </p:par>
+                  <p:par>
+                    <p:cTn id="13" fill="hold">
+                      <p:stCondLst>
+                        <p:cond delay="indefinite"/>
+                      </p:stCondLst>
+                      <p:childTnLst>
+                        <p:par>
+                          <p:cTn id="14" fill="hold">
+                            <p:stCondLst>
+                              <p:cond delay="0"/>
+                            </p:stCondLst>
+                            <p:childTnLst>
+                              <p:par>
+                                <p:cTn id="15" presetID="10" presetClass="entr" presetSubtype="0" fill="hold" nodeType="clickEffect">
+                                  <p:stCondLst>
+                                    <p:cond delay="0"/>
+                                  </p:stCondLst>
+                                  <p:childTnLst>
+                                    <p:set>
+                                      <p:cBhvr>
+                                        <p:cTn id="16" dur="1" fill="hold">
+                                          <p:stCondLst>
+                                            <p:cond delay="0"/>
+                                          </p:stCondLst>
+                                        </p:cTn>
+                                        <p:tgtEl>
+                                          <p:spTgt spid="1032"/>
+                                        </p:tgtEl>
+                                        <p:attrNameLst>
+                                          <p:attrName>style.visibility</p:attrName>
+                                        </p:attrNameLst>
+                                      </p:cBhvr>
+                                      <p:to>
+                                        <p:strVal val="visible"/>
+                                      </p:to>
+                                    </p:set>
+                                    <p:animEffect transition="in" filter="fade">
+                                      <p:cBhvr>
+                                        <p:cTn id="17" dur="500"/>
+                                        <p:tgtEl>
+                                          <p:spTgt spid="1032"/>
+                                        </p:tgtEl>
+                                      </p:cBhvr>
+                                    </p:animEffect>
+                                  </p:childTnLst>
+                                </p:cTn>
+                              </p:par>
+                            </p:childTnLst>
+                          </p:cTn>
+                        </p:par>
+                      </p:childTnLst>
+                    </p:cTn>
+                  </p:par>
+                </p:childTnLst>
+              </p:cTn>
+              <p:prevCondLst>
+                <p:cond evt="onPrev" delay="0">
+                  <p:tgtEl>
+                    <p:sldTgt/>
+                  </p:tgtEl>
+                </p:cond>
+              </p:prevCondLst>
+              <p:nextCondLst>
+                <p:cond evt="onNext" delay="0">
+                  <p:tgtEl>
+                    <p:sldTgt/>
+                  </p:tgtEl>
+                </p:cond>
+              </p:nextCondLst>
+            </p:seq>
+          </p:childTnLst>
+        </p:cTn>
       </p:par>
     </p:tnLst>
   </p:timing>
@@ -5603,59 +6516,16 @@
         </p:nvSpPr>
         <p:spPr/>
         <p:txBody>
-          <a:bodyPr/>
+          <a:bodyPr>
+            <a:normAutofit/>
+          </a:bodyPr>
           <a:lstStyle/>
           <a:p>
             <a:r>
-              <a:rPr lang="en-US" dirty="0" smtClean="0"/>
-              <a:t>Data</a:t>
-            </a:r>
-            <a:br>
-              <a:rPr lang="en-US" dirty="0" smtClean="0"/>
-            </a:br>
-            <a:r>
-              <a:rPr lang="en-US" dirty="0"/>
-              <a:t/>
-            </a:r>
-            <a:br>
-              <a:rPr lang="en-US" dirty="0"/>
-            </a:br>
-            <a:r>
-              <a:rPr lang="en-US" sz="4800" i="1" dirty="0" smtClean="0">
-                <a:solidFill>
-                  <a:srgbClr val="FF66CC"/>
-                </a:solidFill>
-              </a:rPr>
-              <a:t>geojson.io</a:t>
-            </a:r>
-            <a:r>
-              <a:rPr lang="en-US" sz="4800" i="1" dirty="0">
-                <a:solidFill>
-                  <a:srgbClr val="FF66CC"/>
-                </a:solidFill>
-              </a:rPr>
-              <a:t/>
-            </a:r>
-            <a:br>
-              <a:rPr lang="en-US" sz="4800" i="1" dirty="0">
-                <a:solidFill>
-                  <a:srgbClr val="FF66CC"/>
-                </a:solidFill>
-              </a:rPr>
-            </a:br>
-            <a:r>
-              <a:rPr lang="en-US" sz="4800" i="1" dirty="0" smtClean="0">
-                <a:solidFill>
-                  <a:srgbClr val="FF66CC"/>
-                </a:solidFill>
-              </a:rPr>
-              <a:t>overpass-turbo.eu</a:t>
-            </a:r>
-            <a:endParaRPr lang="en-US" i="1" dirty="0">
-              <a:solidFill>
-                <a:srgbClr val="FF66CC"/>
-              </a:solidFill>
-            </a:endParaRPr>
+              <a:rPr lang="en-US" sz="6000" dirty="0" smtClean="0"/>
+              <a:t>Let’s Make A Map!</a:t>
+            </a:r>
+            <a:endParaRPr lang="en-US" sz="6000" dirty="0"/>
           </a:p>
         </p:txBody>
       </p:sp>
@@ -5701,29 +6571,24 @@
             <p:ph type="title"/>
           </p:nvPr>
         </p:nvSpPr>
-        <p:spPr>
-          <a:xfrm>
-            <a:off x="0" y="205978"/>
-            <a:ext cx="9144000" cy="4423171"/>
-          </a:xfrm>
-        </p:spPr>
+        <p:spPr/>
         <p:txBody>
           <a:bodyPr/>
           <a:lstStyle/>
           <a:p>
             <a:r>
               <a:rPr lang="en-US" dirty="0" smtClean="0"/>
-              <a:t>fork my repo</a:t>
+              <a:t>Base Map</a:t>
             </a:r>
             <a:br>
               <a:rPr lang="en-US" dirty="0" smtClean="0"/>
             </a:br>
             <a:r>
-              <a:rPr lang="en-US" dirty="0"/>
+              <a:rPr lang="en-US" dirty="0" smtClean="0"/>
               <a:t/>
             </a:r>
             <a:br>
-              <a:rPr lang="en-US" dirty="0"/>
+              <a:rPr lang="en-US" dirty="0" smtClean="0"/>
             </a:br>
             <a:r>
               <a:rPr lang="en-US" sz="4800" i="1" dirty="0" smtClean="0">
@@ -5731,7 +6596,7 @@
                   <a:srgbClr val="FF66CC"/>
                 </a:solidFill>
               </a:rPr>
-              <a:t>https://github.com/willbreitkreutz/web_mapping_workshop</a:t>
+              <a:t>mapbox.com</a:t>
             </a:r>
             <a:endParaRPr lang="en-US" i="1" dirty="0">
               <a:solidFill>
@@ -5783,6 +6648,265 @@
             <p:ph type="title"/>
           </p:nvPr>
         </p:nvSpPr>
+        <p:spPr/>
+        <p:txBody>
+          <a:bodyPr/>
+          <a:lstStyle/>
+          <a:p>
+            <a:r>
+              <a:rPr lang="en-US" dirty="0" smtClean="0"/>
+              <a:t>Hosting</a:t>
+            </a:r>
+            <a:br>
+              <a:rPr lang="en-US" dirty="0" smtClean="0"/>
+            </a:br>
+            <a:r>
+              <a:rPr lang="en-US" dirty="0"/>
+              <a:t/>
+            </a:r>
+            <a:br>
+              <a:rPr lang="en-US" dirty="0"/>
+            </a:br>
+            <a:r>
+              <a:rPr lang="en-US" sz="4800" i="1" dirty="0" smtClean="0">
+                <a:solidFill>
+                  <a:srgbClr val="FF66CC"/>
+                </a:solidFill>
+              </a:rPr>
+              <a:t>github.com</a:t>
+            </a:r>
+            <a:endParaRPr lang="en-US" i="1" dirty="0">
+              <a:solidFill>
+                <a:srgbClr val="FF66CC"/>
+              </a:solidFill>
+            </a:endParaRPr>
+          </a:p>
+        </p:txBody>
+      </p:sp>
+    </p:spTree>
+  </p:cSld>
+  <p:clrMapOvr>
+    <a:masterClrMapping/>
+  </p:clrMapOvr>
+  <p:timing>
+    <p:tnLst>
+      <p:par>
+        <p:cTn id="1" dur="indefinite" restart="never" nodeType="tmRoot"/>
+      </p:par>
+    </p:tnLst>
+  </p:timing>
+</p:sld>
+</file>
+
+<file path=ppt/slides/slide23.xml><?xml version="1.0" encoding="utf-8"?>
+<p:sld xmlns:a="http://schemas.openxmlformats.org/drawingml/2006/main" xmlns:r="http://schemas.openxmlformats.org/officeDocument/2006/relationships" xmlns:p="http://schemas.openxmlformats.org/presentationml/2006/main">
+  <p:cSld>
+    <p:spTree>
+      <p:nvGrpSpPr>
+        <p:cNvPr id="1" name=""/>
+        <p:cNvGrpSpPr/>
+        <p:nvPr/>
+      </p:nvGrpSpPr>
+      <p:grpSpPr>
+        <a:xfrm>
+          <a:off x="0" y="0"/>
+          <a:ext cx="0" cy="0"/>
+          <a:chOff x="0" y="0"/>
+          <a:chExt cx="0" cy="0"/>
+        </a:xfrm>
+      </p:grpSpPr>
+      <p:sp>
+        <p:nvSpPr>
+          <p:cNvPr id="2" name="Title 1"/>
+          <p:cNvSpPr>
+            <a:spLocks noGrp="1"/>
+          </p:cNvSpPr>
+          <p:nvPr>
+            <p:ph type="title"/>
+          </p:nvPr>
+        </p:nvSpPr>
+        <p:spPr/>
+        <p:txBody>
+          <a:bodyPr/>
+          <a:lstStyle/>
+          <a:p>
+            <a:r>
+              <a:rPr lang="en-US" dirty="0" smtClean="0"/>
+              <a:t>Data</a:t>
+            </a:r>
+            <a:br>
+              <a:rPr lang="en-US" dirty="0" smtClean="0"/>
+            </a:br>
+            <a:r>
+              <a:rPr lang="en-US" dirty="0"/>
+              <a:t/>
+            </a:r>
+            <a:br>
+              <a:rPr lang="en-US" dirty="0"/>
+            </a:br>
+            <a:r>
+              <a:rPr lang="en-US" sz="4800" i="1" dirty="0" smtClean="0">
+                <a:solidFill>
+                  <a:srgbClr val="FF66CC"/>
+                </a:solidFill>
+              </a:rPr>
+              <a:t>geojson.io</a:t>
+            </a:r>
+            <a:r>
+              <a:rPr lang="en-US" sz="4800" i="1" dirty="0">
+                <a:solidFill>
+                  <a:srgbClr val="FF66CC"/>
+                </a:solidFill>
+              </a:rPr>
+              <a:t/>
+            </a:r>
+            <a:br>
+              <a:rPr lang="en-US" sz="4800" i="1" dirty="0">
+                <a:solidFill>
+                  <a:srgbClr val="FF66CC"/>
+                </a:solidFill>
+              </a:rPr>
+            </a:br>
+            <a:r>
+              <a:rPr lang="en-US" sz="4800" i="1" dirty="0" smtClean="0">
+                <a:solidFill>
+                  <a:srgbClr val="FF66CC"/>
+                </a:solidFill>
+              </a:rPr>
+              <a:t>overpass-turbo.eu</a:t>
+            </a:r>
+            <a:endParaRPr lang="en-US" i="1" dirty="0">
+              <a:solidFill>
+                <a:srgbClr val="FF66CC"/>
+              </a:solidFill>
+            </a:endParaRPr>
+          </a:p>
+        </p:txBody>
+      </p:sp>
+    </p:spTree>
+  </p:cSld>
+  <p:clrMapOvr>
+    <a:masterClrMapping/>
+  </p:clrMapOvr>
+  <p:timing>
+    <p:tnLst>
+      <p:par>
+        <p:cTn id="1" dur="indefinite" restart="never" nodeType="tmRoot"/>
+      </p:par>
+    </p:tnLst>
+  </p:timing>
+</p:sld>
+</file>
+
+<file path=ppt/slides/slide24.xml><?xml version="1.0" encoding="utf-8"?>
+<p:sld xmlns:a="http://schemas.openxmlformats.org/drawingml/2006/main" xmlns:r="http://schemas.openxmlformats.org/officeDocument/2006/relationships" xmlns:p="http://schemas.openxmlformats.org/presentationml/2006/main">
+  <p:cSld>
+    <p:spTree>
+      <p:nvGrpSpPr>
+        <p:cNvPr id="1" name=""/>
+        <p:cNvGrpSpPr/>
+        <p:nvPr/>
+      </p:nvGrpSpPr>
+      <p:grpSpPr>
+        <a:xfrm>
+          <a:off x="0" y="0"/>
+          <a:ext cx="0" cy="0"/>
+          <a:chOff x="0" y="0"/>
+          <a:chExt cx="0" cy="0"/>
+        </a:xfrm>
+      </p:grpSpPr>
+      <p:sp>
+        <p:nvSpPr>
+          <p:cNvPr id="2" name="Title 1"/>
+          <p:cNvSpPr>
+            <a:spLocks noGrp="1"/>
+          </p:cNvSpPr>
+          <p:nvPr>
+            <p:ph type="title"/>
+          </p:nvPr>
+        </p:nvSpPr>
+        <p:spPr>
+          <a:xfrm>
+            <a:off x="0" y="205978"/>
+            <a:ext cx="9144000" cy="4423171"/>
+          </a:xfrm>
+        </p:spPr>
+        <p:txBody>
+          <a:bodyPr/>
+          <a:lstStyle/>
+          <a:p>
+            <a:r>
+              <a:rPr lang="en-US" dirty="0" smtClean="0"/>
+              <a:t>fork my repo</a:t>
+            </a:r>
+            <a:br>
+              <a:rPr lang="en-US" dirty="0" smtClean="0"/>
+            </a:br>
+            <a:r>
+              <a:rPr lang="en-US" dirty="0"/>
+              <a:t/>
+            </a:r>
+            <a:br>
+              <a:rPr lang="en-US" dirty="0"/>
+            </a:br>
+            <a:r>
+              <a:rPr lang="en-US" sz="4800" i="1" dirty="0" smtClean="0">
+                <a:solidFill>
+                  <a:srgbClr val="FF66CC"/>
+                </a:solidFill>
+              </a:rPr>
+              <a:t>https://github.com/willbreitkreutz/web_mapping_workshop</a:t>
+            </a:r>
+            <a:endParaRPr lang="en-US" i="1" dirty="0">
+              <a:solidFill>
+                <a:srgbClr val="FF66CC"/>
+              </a:solidFill>
+            </a:endParaRPr>
+          </a:p>
+        </p:txBody>
+      </p:sp>
+    </p:spTree>
+  </p:cSld>
+  <p:clrMapOvr>
+    <a:masterClrMapping/>
+  </p:clrMapOvr>
+  <p:timing>
+    <p:tnLst>
+      <p:par>
+        <p:cTn id="1" dur="indefinite" restart="never" nodeType="tmRoot"/>
+      </p:par>
+    </p:tnLst>
+  </p:timing>
+</p:sld>
+</file>
+
+<file path=ppt/slides/slide25.xml><?xml version="1.0" encoding="utf-8"?>
+<p:sld xmlns:a="http://schemas.openxmlformats.org/drawingml/2006/main" xmlns:r="http://schemas.openxmlformats.org/officeDocument/2006/relationships" xmlns:p="http://schemas.openxmlformats.org/presentationml/2006/main">
+  <p:cSld>
+    <p:spTree>
+      <p:nvGrpSpPr>
+        <p:cNvPr id="1" name=""/>
+        <p:cNvGrpSpPr/>
+        <p:nvPr/>
+      </p:nvGrpSpPr>
+      <p:grpSpPr>
+        <a:xfrm>
+          <a:off x="0" y="0"/>
+          <a:ext cx="0" cy="0"/>
+          <a:chOff x="0" y="0"/>
+          <a:chExt cx="0" cy="0"/>
+        </a:xfrm>
+      </p:grpSpPr>
+      <p:sp>
+        <p:nvSpPr>
+          <p:cNvPr id="2" name="Title 1"/>
+          <p:cNvSpPr>
+            <a:spLocks noGrp="1"/>
+          </p:cNvSpPr>
+          <p:nvPr>
+            <p:ph type="title"/>
+          </p:nvPr>
+        </p:nvSpPr>
         <p:spPr>
           <a:xfrm>
             <a:off x="1981200" y="742950"/>
@@ -5976,7 +7100,7 @@
 </p:sld>
 </file>
 
-<file path=ppt/slides/slide23.xml><?xml version="1.0" encoding="utf-8"?>
+<file path=ppt/slides/slide26.xml><?xml version="1.0" encoding="utf-8"?>
 <p:sld xmlns:a="http://schemas.openxmlformats.org/drawingml/2006/main" xmlns:r="http://schemas.openxmlformats.org/officeDocument/2006/relationships" xmlns:p="http://schemas.openxmlformats.org/presentationml/2006/main">
   <p:cSld>
     <p:spTree>
@@ -6581,7 +7705,7 @@
                   <a:srgbClr val="1AAEDC"/>
                 </a:solidFill>
               </a:rPr>
-              <a:t>or…</a:t>
+              <a:t>aka…</a:t>
             </a:r>
             <a:r>
               <a:rPr lang="en-US" dirty="0" smtClean="0"/>
@@ -8166,30 +9290,21 @@
                             </p:childTnLst>
                           </p:cTn>
                         </p:par>
-                      </p:childTnLst>
-                    </p:cTn>
-                  </p:par>
-                  <p:par>
-                    <p:cTn id="20" fill="hold">
-                      <p:stCondLst>
-                        <p:cond delay="indefinite"/>
-                      </p:stCondLst>
-                      <p:childTnLst>
                         <p:par>
-                          <p:cTn id="21" fill="hold">
+                          <p:cTn id="20" fill="hold">
                             <p:stCondLst>
-                              <p:cond delay="0"/>
+                              <p:cond delay="500"/>
                             </p:stCondLst>
                             <p:childTnLst>
                               <p:par>
-                                <p:cTn id="22" presetID="10" presetClass="entr" presetSubtype="0" fill="hold" grpId="0" nodeType="clickEffect">
+                                <p:cTn id="21" presetID="10" presetClass="entr" presetSubtype="0" fill="hold" grpId="0" nodeType="afterEffect">
                                   <p:stCondLst>
                                     <p:cond delay="0"/>
                                   </p:stCondLst>
                                   <p:childTnLst>
                                     <p:set>
                                       <p:cBhvr>
-                                        <p:cTn id="23" dur="1" fill="hold">
+                                        <p:cTn id="22" dur="1" fill="hold">
                                           <p:stCondLst>
                                             <p:cond delay="0"/>
                                           </p:stCondLst>
@@ -8207,7 +9322,7 @@
                                     </p:set>
                                     <p:animEffect transition="in" filter="fade">
                                       <p:cBhvr>
-                                        <p:cTn id="24" dur="500"/>
+                                        <p:cTn id="23" dur="500"/>
                                         <p:tgtEl>
                                           <p:spTgt spid="23"/>
                                         </p:tgtEl>

</xml_diff>